<commit_message>
adding R markdown update
</commit_message>
<xml_diff>
--- a/report_ppt.pptx
+++ b/report_ppt.pptx
@@ -3235,6 +3235,63 @@
           </a:p>
         </p:txBody>
       </p:sp>
+      <p:sp>
+        <p:nvSpPr>
+          <p:cNvPr id="3" name="Content Placeholder 2"/>
+          <p:cNvSpPr>
+            <a:spLocks noGrp="1"/>
+          </p:cNvSpPr>
+          <p:nvPr>
+            <p:ph idx="1"/>
+          </p:nvPr>
+        </p:nvSpPr>
+        <p:spPr/>
+        <p:txBody>
+          <a:bodyPr/>
+          <a:lstStyle/>
+          <a:p>
+            <a:pPr lvl="0"/>
+            <a:r>
+              <a:rPr/>
+              <a:t>Describe sample</a:t>
+            </a:r>
+          </a:p>
+          <a:p>
+            <a:pPr lvl="0" indent="0">
+              <a:buNone/>
+            </a:pPr>
+            <a:r>
+              <a:rPr>
+                <a:latin typeface="Courier"/>
+              </a:rPr>
+              <a:t>## Warning in table1.formula(~factor(s_teneviv) | at_msamean, data =
+## filtered_barrera): Terms to the right of '|' in formula 'x' define table
+## columns and are expected to be factors with meaningful labels.</a:t>
+            </a:r>
+          </a:p>
+          <a:p>
+            <a:pPr lvl="0" indent="0">
+              <a:buNone/>
+            </a:pPr>
+            <a:r>
+              <a:rPr>
+                <a:latin typeface="Courier"/>
+              </a:rPr>
+              <a:t>## Warning in .table1.internal(x = x, labels = labels, groupspan = groupspan, :
+## Table has 39 columns. Are you sure this is what you want?</a:t>
+            </a:r>
+          </a:p>
+          <a:p>
+            <a:pPr lvl="0" indent="0" marL="0">
+              <a:buNone/>
+            </a:pPr>
+            <a:r>
+              <a:rPr/>
+              <a:t>table1</a:t>
+            </a:r>
+          </a:p>
+        </p:txBody>
+      </p:sp>
     </p:spTree>
   </p:cSld>
 </p:sld>
@@ -3308,6 +3365,33 @@
             <a:r>
               <a:rPr/>
               <a:t>How robust are the results to changing the sample?</a:t>
+            </a:r>
+          </a:p>
+          <a:p>
+            <a:pPr lvl="0" indent="0">
+              <a:buNone/>
+            </a:pPr>
+            <a:r>
+              <a:rPr>
+                <a:latin typeface="Courier"/>
+              </a:rPr>
+              <a:t>## Loading required namespace: sandwich</a:t>
+            </a:r>
+          </a:p>
+          <a:p>
+            <a:pPr lvl="0" indent="0">
+              <a:buNone/>
+            </a:pPr>
+            <a:r>
+              <a:rPr>
+                <a:latin typeface="Courier"/>
+              </a:rPr>
+              <a:t>## R^2= 0.00292 
+## 
+##               Estimate  Std. Error  t value     Pr(&gt;|t|)
+## (Intercept) 0.79227773 0.014302611 55.39392 0.000000e+00
+## T1_treat    0.03254290 0.007498849  4.33972 1.426644e-05
+## T2_treat    0.02875513 0.008238253  3.49044 4.822256e-04</a:t>
             </a:r>
           </a:p>
         </p:txBody>

</xml_diff>